<commit_message>
Added some clearer milestones to Concept Maps presentation
</commit_message>
<xml_diff>
--- a/tools/Import workflows into TeSS Concept Maps/Biohackathon-TeSS-ConceptMaps.pptx
+++ b/tools/Import workflows into TeSS Concept Maps/Biohackathon-TeSS-ConceptMaps.pptx
@@ -1432,7 +1432,61 @@
               </a:spcAft>
               <a:buNone/>
             </a:pPr>
-            <a:endParaRPr/>
+            <a:r>
+              <a:rPr lang="en-GB" dirty="0" smtClean="0"/>
+              <a:t>Condense</a:t>
+            </a:r>
+            <a:r>
+              <a:rPr lang="en-GB" baseline="0" dirty="0" smtClean="0"/>
+              <a:t> technical workflows into a simplified, conceptual representation</a:t>
+            </a:r>
+          </a:p>
+          <a:p>
+            <a:pPr marL="0" lvl="0" indent="0" algn="l" rtl="0">
+              <a:spcBef>
+                <a:spcPts val="0"/>
+              </a:spcBef>
+              <a:spcAft>
+                <a:spcPts val="0"/>
+              </a:spcAft>
+              <a:buNone/>
+            </a:pPr>
+            <a:endParaRPr lang="en-GB" baseline="0" dirty="0" smtClean="0"/>
+          </a:p>
+          <a:p>
+            <a:pPr marL="0" lvl="0" indent="0" algn="l" rtl="0">
+              <a:spcBef>
+                <a:spcPts val="0"/>
+              </a:spcBef>
+              <a:spcAft>
+                <a:spcPts val="0"/>
+              </a:spcAft>
+              <a:buNone/>
+            </a:pPr>
+            <a:r>
+              <a:rPr lang="en-GB" baseline="0" dirty="0" smtClean="0"/>
+              <a:t>Break it down </a:t>
+            </a:r>
+            <a:r>
+              <a:rPr lang="mr-IN" baseline="0" dirty="0" smtClean="0"/>
+              <a:t>–</a:t>
+            </a:r>
+            <a:r>
+              <a:rPr lang="en-GB" baseline="0" dirty="0" smtClean="0"/>
+              <a:t> Data feeds into Operation. Operation returns data. And so on</a:t>
+            </a:r>
+          </a:p>
+          <a:p>
+            <a:pPr marL="0" lvl="0" indent="0" algn="l" rtl="0">
+              <a:spcBef>
+                <a:spcPts val="0"/>
+              </a:spcBef>
+              <a:spcAft>
+                <a:spcPts val="0"/>
+              </a:spcAft>
+              <a:buNone/>
+            </a:pPr>
+            <a:endParaRPr dirty="0"/>
           </a:p>
         </p:txBody>
       </p:sp>
@@ -1536,7 +1590,50 @@
               </a:spcAft>
               <a:buNone/>
             </a:pPr>
-            <a:endParaRPr/>
+            <a:r>
+              <a:rPr lang="en-GB" dirty="0" smtClean="0"/>
+              <a:t>Description is context</a:t>
+            </a:r>
+            <a:r>
+              <a:rPr lang="en-GB" baseline="0" dirty="0" smtClean="0"/>
+              <a:t> specific </a:t>
+            </a:r>
+          </a:p>
+          <a:p>
+            <a:pPr marL="0" lvl="0" indent="0" algn="l" rtl="0">
+              <a:spcBef>
+                <a:spcPts val="0"/>
+              </a:spcBef>
+              <a:spcAft>
+                <a:spcPts val="0"/>
+              </a:spcAft>
+              <a:buNone/>
+            </a:pPr>
+            <a:endParaRPr lang="en-GB" dirty="0" smtClean="0"/>
+          </a:p>
+          <a:p>
+            <a:pPr marL="0" lvl="0" indent="0" algn="l" rtl="0">
+              <a:spcBef>
+                <a:spcPts val="0"/>
+              </a:spcBef>
+              <a:spcAft>
+                <a:spcPts val="0"/>
+              </a:spcAft>
+              <a:buNone/>
+            </a:pPr>
+            <a:r>
+              <a:rPr lang="en-GB" dirty="0" smtClean="0"/>
+              <a:t>Not only to TEACH with,</a:t>
+            </a:r>
+            <a:r>
+              <a:rPr lang="en-GB" baseline="0" dirty="0" smtClean="0"/>
+              <a:t> </a:t>
+            </a:r>
+            <a:r>
+              <a:rPr lang="en-GB" dirty="0" smtClean="0"/>
+              <a:t>but also to INFORM of available resources. Acts as a </a:t>
+            </a:r>
+            <a:endParaRPr dirty="0"/>
           </a:p>
         </p:txBody>
       </p:sp>
@@ -6977,18 +7074,14 @@
           </a:bodyPr>
           <a:lstStyle/>
           <a:p>
-            <a:pPr marL="0" lvl="0" indent="0" algn="ctr" rtl="0">
-              <a:spcBef>
-                <a:spcPts val="0"/>
-              </a:spcBef>
-              <a:spcAft>
-                <a:spcPts val="0"/>
-              </a:spcAft>
-              <a:buNone/>
-            </a:pPr>
+            <a:pPr lvl="0"/>
+            <a:r>
+              <a:rPr lang="en-GB" dirty="0"/>
+              <a:t>Import Workflows (Galaxy/</a:t>
+            </a:r>
             <a:r>
               <a:rPr lang="en-GB" dirty="0" smtClean="0"/>
-              <a:t>Import Galaxy/CWL Workflows into </a:t>
+              <a:t>CWL) into </a:t>
             </a:r>
             <a:r>
               <a:rPr lang="en-GB" dirty="0" err="1" smtClean="0"/>
@@ -7170,24 +7263,16 @@
               <a:buChar char="●"/>
             </a:pPr>
             <a:r>
-              <a:rPr lang="en-US" sz="1400" dirty="0"/>
+              <a:rPr lang="en-US" sz="1400" dirty="0" smtClean="0"/>
               <a:t>[</a:t>
             </a:r>
             <a:r>
               <a:rPr lang="en-US" sz="1400" dirty="0" err="1" smtClean="0"/>
-              <a:t>Github</a:t>
+              <a:t>BioHackathon</a:t>
             </a:r>
             <a:r>
               <a:rPr lang="en-US" sz="1400" dirty="0" smtClean="0"/>
-              <a:t> </a:t>
-            </a:r>
-            <a:r>
-              <a:rPr lang="en-US" sz="1400" dirty="0"/>
-              <a:t>Page</a:t>
-            </a:r>
-            <a:r>
-              <a:rPr lang="en-US" sz="1400" dirty="0" smtClean="0"/>
-              <a:t>](</a:t>
+              <a:t> Folder](</a:t>
             </a:r>
             <a:r>
               <a:rPr lang="en-US" sz="1400" u="sng" dirty="0" smtClean="0">
@@ -7206,6 +7291,11 @@
               </a:rPr>
               <a:t>)</a:t>
             </a:r>
+            <a:endParaRPr lang="en-US" sz="1400" dirty="0">
+              <a:solidFill>
+                <a:srgbClr val="FF9900"/>
+              </a:solidFill>
+            </a:endParaRPr>
           </a:p>
           <a:p>
             <a:pPr lvl="0" indent="-317500">
@@ -7216,16 +7306,28 @@
               <a:buChar char="●"/>
             </a:pPr>
             <a:r>
+              <a:rPr lang="en-US" sz="1400" dirty="0" smtClean="0"/>
+              <a:t>[</a:t>
+            </a:r>
+            <a:r>
               <a:rPr lang="en-US" sz="1400" dirty="0"/>
-              <a:t>[</a:t>
-            </a:r>
-            <a:r>
-              <a:rPr lang="en-US" sz="1400" dirty="0" err="1"/>
-              <a:t>Github</a:t>
-            </a:r>
-            <a:r>
-              <a:rPr lang="en-US" sz="1400" dirty="0"/>
-              <a:t> Page]</a:t>
+              <a:t>Concept Maps code](</a:t>
+            </a:r>
+            <a:r>
+              <a:rPr lang="en-US" sz="1400" dirty="0">
+                <a:hlinkClick r:id="rId5"/>
+              </a:rPr>
+              <a:t>https://gl.cs.ut.ee/inkuzmin/workflows-</a:t>
+            </a:r>
+            <a:r>
+              <a:rPr lang="en-US" sz="1400" dirty="0" smtClean="0">
+                <a:hlinkClick r:id="rId5"/>
+              </a:rPr>
+              <a:t>js</a:t>
+            </a:r>
+            <a:r>
+              <a:rPr lang="en-US" sz="1400" dirty="0" smtClean="0"/>
+              <a:t>)</a:t>
             </a:r>
           </a:p>
           <a:p>
@@ -7236,9 +7338,9 @@
               <a:buSzPts val="1400"/>
               <a:buChar char="●"/>
             </a:pPr>
-            <a:endParaRPr sz="1400" dirty="0">
+            <a:endParaRPr lang="en-US" sz="1400" u="sng" dirty="0" smtClean="0">
               <a:solidFill>
-                <a:srgbClr val="FF9900"/>
+                <a:schemeClr val="hlink"/>
               </a:solidFill>
             </a:endParaRPr>
           </a:p>
@@ -7312,7 +7414,7 @@
                 <a:solidFill>
                   <a:srgbClr val="FF9900"/>
                 </a:solidFill>
-                <a:hlinkClick r:id="rId5"/>
+                <a:hlinkClick r:id="rId6"/>
               </a:rPr>
               <a:t>http://bh2018paris.info/</a:t>
             </a:r>
@@ -7499,11 +7601,7 @@
             </a:r>
             <a:r>
               <a:rPr lang="en-GB" dirty="0" smtClean="0"/>
-              <a:t>3</a:t>
-            </a:r>
-            <a:r>
-              <a:rPr lang="en-GB" smtClean="0"/>
-              <a:t>/4/5 </a:t>
+              <a:t>3/4/5	 </a:t>
             </a:r>
             <a:r>
               <a:rPr lang="en" dirty="0" smtClean="0"/>
@@ -7946,14 +8044,10 @@
           </a:bodyPr>
           <a:lstStyle/>
           <a:p>
-            <a:pPr marL="127000" lvl="0" indent="0" algn="l" rtl="0">
-              <a:spcBef>
-                <a:spcPts val="0"/>
-              </a:spcBef>
-              <a:spcAft>
-                <a:spcPts val="0"/>
-              </a:spcAft>
-              <a:buSzPts val="1600"/>
+            <a:pPr marL="596900" lvl="1" indent="0">
+              <a:spcBef>
+                <a:spcPts val="0"/>
+              </a:spcBef>
               <a:buNone/>
             </a:pPr>
             <a:endParaRPr lang="en-US" dirty="0"/>
@@ -7998,7 +8092,7 @@
             </a:pPr>
             <a:r>
               <a:rPr lang="en-US" sz="1200" dirty="0"/>
-              <a:t>Identify an appropriate Workflow (Galaxy/CWL/other)</a:t>
+              <a:t>M1.1 Identify an appropriate Workflow (Galaxy/CWL/other)</a:t>
             </a:r>
           </a:p>
           <a:p>
@@ -8010,7 +8104,7 @@
             </a:pPr>
             <a:r>
               <a:rPr lang="en-US" sz="1200" dirty="0"/>
-              <a:t>Author a new Concept Map training material based on this workflow</a:t>
+              <a:t>M1.2 Author a new Concept Map training material based on this workflow</a:t>
             </a:r>
           </a:p>
           <a:p>
@@ -8041,7 +8135,7 @@
             </a:pPr>
             <a:r>
               <a:rPr lang="en-US" dirty="0"/>
-              <a:t>M1.1: Parse Workflow</a:t>
+              <a:t>M2.1: Create a Workflow parser to parse a workflow</a:t>
             </a:r>
           </a:p>
           <a:p>
@@ -8053,7 +8147,7 @@
             </a:pPr>
             <a:r>
               <a:rPr lang="en-US" dirty="0"/>
-              <a:t>M1.2: Generate Concept Map in </a:t>
+              <a:t>M2.2: Generate a Concept Map in </a:t>
             </a:r>
             <a:r>
               <a:rPr lang="en-US" dirty="0" err="1"/>
@@ -8061,7 +8155,7 @@
             </a:r>
             <a:r>
               <a:rPr lang="en-US" dirty="0"/>
-              <a:t> from parsed Workflow</a:t>
+              <a:t> from the information in the parsed Workflow</a:t>
             </a:r>
           </a:p>
           <a:p>
@@ -8073,7 +8167,7 @@
             </a:pPr>
             <a:r>
               <a:rPr lang="en-US" dirty="0"/>
-              <a:t>M1.3: Add description and associate </a:t>
+              <a:t>M2.3: Add a description and associate </a:t>
             </a:r>
             <a:r>
               <a:rPr lang="en-US" dirty="0" err="1"/>
@@ -8096,8 +8190,8 @@
               <a:t>TeSS</a:t>
             </a:r>
             <a:r>
-              <a:rPr lang="en-US" dirty="0"/>
-              <a:t> resources</a:t>
+              <a:rPr lang="en-US"/>
+              <a:t> resources.</a:t>
             </a:r>
           </a:p>
           <a:p>
@@ -9521,7 +9615,7 @@
               <a:buChar char="●"/>
             </a:pPr>
             <a:r>
-              <a:rPr lang="en-GB" sz="1200" dirty="0" smtClean="0">
+              <a:rPr lang="en-GB" sz="1200" b="1" dirty="0" smtClean="0">
                 <a:solidFill>
                   <a:srgbClr val="FFFFFF"/>
                 </a:solidFill>
@@ -9529,12 +9623,20 @@
               <a:t>Educational </a:t>
             </a:r>
             <a:r>
+              <a:rPr lang="en-GB" sz="1200" b="1" dirty="0">
+                <a:solidFill>
+                  <a:srgbClr val="FFFFFF"/>
+                </a:solidFill>
+              </a:rPr>
+              <a:t>information </a:t>
+            </a:r>
+            <a:r>
               <a:rPr lang="en-GB" sz="1200" dirty="0">
                 <a:solidFill>
                   <a:srgbClr val="FFFFFF"/>
                 </a:solidFill>
               </a:rPr>
-              <a:t>information about </a:t>
+              <a:t>about </a:t>
             </a:r>
             <a:r>
               <a:rPr lang="en-GB" sz="1200" dirty="0" smtClean="0">
@@ -9942,14 +10044,13 @@
               <a:buChar char="●"/>
             </a:pPr>
             <a:r>
-              <a:rPr lang="en" dirty="0"/>
-              <a:t>[which problem should be solved / hacked</a:t>
-            </a:r>
-            <a:r>
-              <a:rPr lang="en" dirty="0" smtClean="0"/>
-              <a:t>]</a:t>
-            </a:r>
-            <a:endParaRPr lang="en-GB" dirty="0" smtClean="0"/>
+              <a:rPr lang="en-GB" dirty="0" smtClean="0"/>
+              <a:t>Lots Workflows in </a:t>
+            </a:r>
+            <a:r>
+              <a:rPr lang="en-GB" dirty="0" smtClean="0"/>
+              <a:t>Galaxy and CWL</a:t>
+            </a:r>
           </a:p>
           <a:p>
             <a:pPr marL="457200" marR="0" lvl="0" indent="-330200" algn="l" rtl="0">
@@ -9971,11 +10072,15 @@
             </a:pPr>
             <a:r>
               <a:rPr lang="en-GB" dirty="0" smtClean="0"/>
-              <a:t>There are implementations of workflows in </a:t>
+              <a:t>Few Concept Maps in </a:t>
+            </a:r>
+            <a:r>
+              <a:rPr lang="en-GB" dirty="0" err="1" smtClean="0"/>
+              <a:t>TeSS</a:t>
             </a:r>
             <a:r>
               <a:rPr lang="en-GB" dirty="0" smtClean="0"/>
-              <a:t>Galaxy and CWL</a:t>
+              <a:t> (we’ve just finished implementing it!)</a:t>
             </a:r>
           </a:p>
           <a:p>
@@ -9996,36 +10101,38 @@
               <a:buFont typeface="Arial"/>
               <a:buChar char="●"/>
             </a:pPr>
-            <a:r>
-              <a:rPr lang="en-GB" dirty="0" smtClean="0"/>
-              <a:t>Training is important! Concept Maps help</a:t>
-            </a:r>
-            <a:r>
-              <a:rPr lang="mr-IN" dirty="0" smtClean="0"/>
-              <a:t>…</a:t>
-            </a:r>
             <a:endParaRPr lang="en-GB" dirty="0" smtClean="0"/>
           </a:p>
           <a:p>
-            <a:pPr lvl="1" indent="-330200">
-              <a:spcBef>
-                <a:spcPts val="0"/>
-              </a:spcBef>
+            <a:pPr marL="457200" marR="0" lvl="0" indent="-330200" algn="l" rtl="0">
+              <a:lnSpc>
+                <a:spcPct val="115000"/>
+              </a:lnSpc>
+              <a:spcBef>
+                <a:spcPts val="0"/>
+              </a:spcBef>
+              <a:spcAft>
+                <a:spcPts val="0"/>
+              </a:spcAft>
+              <a:buClr>
+                <a:srgbClr val="FFFFFF"/>
+              </a:buClr>
               <a:buSzPts val="1600"/>
               <a:buFont typeface="Arial"/>
               <a:buChar char="●"/>
             </a:pPr>
             <a:r>
+              <a:rPr lang="en-GB" dirty="0" smtClean="0"/>
+              <a:t>Training is important! Concept Maps help</a:t>
+            </a:r>
+            <a:r>
               <a:rPr lang="mr-IN" dirty="0" smtClean="0"/>
               <a:t>…</a:t>
             </a:r>
-            <a:r>
-              <a:rPr lang="en-GB" dirty="0" smtClean="0"/>
-              <a:t>Researchers/developers understand workflows</a:t>
-            </a:r>
-          </a:p>
-          <a:p>
-            <a:pPr lvl="2" indent="-330200">
+            <a:endParaRPr lang="en-GB" dirty="0" smtClean="0"/>
+          </a:p>
+          <a:p>
+            <a:pPr lvl="1" indent="-330200">
               <a:spcBef>
                 <a:spcPts val="0"/>
               </a:spcBef>
@@ -10034,12 +10141,16 @@
               <a:buChar char="●"/>
             </a:pPr>
             <a:r>
+              <a:rPr lang="mr-IN" dirty="0" smtClean="0"/>
+              <a:t>…</a:t>
+            </a:r>
+            <a:r>
               <a:rPr lang="en-GB" dirty="0" smtClean="0"/>
-              <a:t>Use them appropriately, correctly, &amp; contribute back to</a:t>
-            </a:r>
-          </a:p>
-          <a:p>
-            <a:pPr lvl="1" indent="-330200">
+              <a:t>Researchers/developers understand workflows</a:t>
+            </a:r>
+          </a:p>
+          <a:p>
+            <a:pPr lvl="2" indent="-330200">
               <a:spcBef>
                 <a:spcPts val="0"/>
               </a:spcBef>
@@ -10048,16 +10159,12 @@
               <a:buChar char="●"/>
             </a:pPr>
             <a:r>
-              <a:rPr lang="mr-IN" dirty="0" smtClean="0"/>
-              <a:t>…</a:t>
-            </a:r>
-            <a:r>
               <a:rPr lang="en-GB" dirty="0" smtClean="0"/>
-              <a:t>Workflows become more widely adopted</a:t>
-            </a:r>
-          </a:p>
-          <a:p>
-            <a:pPr lvl="2" indent="-330200">
+              <a:t>Use them appropriately, correctly, &amp; contribute back to</a:t>
+            </a:r>
+          </a:p>
+          <a:p>
+            <a:pPr lvl="1" indent="-330200">
               <a:spcBef>
                 <a:spcPts val="0"/>
               </a:spcBef>
@@ -10066,10 +10173,13 @@
               <a:buChar char="●"/>
             </a:pPr>
             <a:r>
+              <a:rPr lang="mr-IN" dirty="0" smtClean="0"/>
+              <a:t>…</a:t>
+            </a:r>
+            <a:r>
               <a:rPr lang="en-GB" dirty="0" smtClean="0"/>
-              <a:t>More educational resources helps spread adoption</a:t>
-            </a:r>
-            <a:endParaRPr lang="en-GB" dirty="0"/>
+              <a:t>Workflows become more widely adopted</a:t>
+            </a:r>
           </a:p>
           <a:p>
             <a:pPr lvl="2" indent="-330200">
@@ -10080,12 +10190,30 @@
               <a:buFont typeface="Arial"/>
               <a:buChar char="●"/>
             </a:pPr>
+            <a:r>
+              <a:rPr lang="en-GB" dirty="0" smtClean="0"/>
+              <a:t>More educational resources helps spread adoption</a:t>
+            </a:r>
+            <a:endParaRPr lang="en-GB" dirty="0"/>
+          </a:p>
+          <a:p>
+            <a:pPr lvl="2" indent="-330200">
+              <a:spcBef>
+                <a:spcPts val="0"/>
+              </a:spcBef>
+              <a:buSzPts val="1600"/>
+              <a:buFont typeface="Arial"/>
+              <a:buChar char="●"/>
+            </a:pPr>
             <a:endParaRPr lang="en-GB" dirty="0" smtClean="0"/>
           </a:p>
           <a:p>
+            <a:endParaRPr lang="en-GB" dirty="0" smtClean="0"/>
+          </a:p>
+          <a:p>
             <a:r>
               <a:rPr lang="en-GB" dirty="0" smtClean="0"/>
-              <a:t>So, make new training resources by importing Workflows into </a:t>
+              <a:t>So, the aim is to make new Concept Maps in </a:t>
             </a:r>
             <a:r>
               <a:rPr lang="en-GB" dirty="0" err="1" smtClean="0"/>
@@ -10093,7 +10221,7 @@
             </a:r>
             <a:r>
               <a:rPr lang="en-GB" dirty="0" smtClean="0"/>
-              <a:t> Concept Maps</a:t>
+              <a:t> by importing Workflows into the editor; ready to be turned into real training materials.</a:t>
             </a:r>
           </a:p>
           <a:p>
@@ -10742,6 +10870,46 @@
             <a:endParaRPr lang="en-GB" dirty="0"/>
           </a:p>
           <a:p>
+            <a:pPr marL="596900" lvl="1" indent="0" algn="l" rtl="0">
+              <a:lnSpc>
+                <a:spcPct val="115000"/>
+              </a:lnSpc>
+              <a:spcBef>
+                <a:spcPts val="0"/>
+              </a:spcBef>
+              <a:spcAft>
+                <a:spcPts val="0"/>
+              </a:spcAft>
+              <a:buSzPts val="1400"/>
+              <a:buNone/>
+            </a:pPr>
+            <a:endParaRPr dirty="0"/>
+          </a:p>
+          <a:p>
+            <a:pPr marL="457200" lvl="0" indent="-330200" algn="l" rtl="0">
+              <a:lnSpc>
+                <a:spcPct val="115000"/>
+              </a:lnSpc>
+              <a:spcBef>
+                <a:spcPts val="0"/>
+              </a:spcBef>
+              <a:spcAft>
+                <a:spcPts val="0"/>
+              </a:spcAft>
+              <a:buSzPts val="1600"/>
+              <a:buChar char="●"/>
+            </a:pPr>
+            <a:r>
+              <a:rPr lang="en" b="1" dirty="0"/>
+              <a:t>Expected results </a:t>
+            </a:r>
+            <a:r>
+              <a:rPr lang="en" dirty="0"/>
+              <a:t>at the end of the hackathon</a:t>
+            </a:r>
+            <a:endParaRPr dirty="0"/>
+          </a:p>
+          <a:p>
             <a:pPr marL="914400" lvl="1" indent="-317500" algn="l" rtl="0">
               <a:lnSpc>
                 <a:spcPct val="115000"/>
@@ -10755,7 +10923,43 @@
               <a:buSzPts val="1400"/>
               <a:buChar char="○"/>
             </a:pPr>
-            <a:endParaRPr lang="en-GB" dirty="0" smtClean="0"/>
+            <a:r>
+              <a:rPr lang="en-GB" dirty="0" smtClean="0"/>
+              <a:t>M1: </a:t>
+            </a:r>
+            <a:r>
+              <a:rPr lang="en-GB" i="1" dirty="0" smtClean="0"/>
+              <a:t>Exploration/Proof of Concept</a:t>
+            </a:r>
+          </a:p>
+          <a:p>
+            <a:pPr lvl="2">
+              <a:spcBef>
+                <a:spcPts val="0"/>
+              </a:spcBef>
+              <a:buChar char="○"/>
+            </a:pPr>
+            <a:r>
+              <a:rPr lang="en-GB" sz="1200" dirty="0" smtClean="0"/>
+              <a:t>M1.1 Identif</a:t>
+            </a:r>
+            <a:r>
+              <a:rPr lang="en-GB" sz="1200" dirty="0" smtClean="0"/>
+              <a:t>y an appropriate Workflow (Galaxy/CWL/other)</a:t>
+            </a:r>
+          </a:p>
+          <a:p>
+            <a:pPr lvl="2">
+              <a:spcBef>
+                <a:spcPts val="0"/>
+              </a:spcBef>
+              <a:buChar char="○"/>
+            </a:pPr>
+            <a:r>
+              <a:rPr lang="en-GB" sz="1200" dirty="0" smtClean="0"/>
+              <a:t>M1.2 Author a new Concept Map training material based on this workflow</a:t>
+            </a:r>
+            <a:endParaRPr sz="1200" dirty="0"/>
           </a:p>
           <a:p>
             <a:pPr marL="914400" lvl="1" indent="-317500" algn="l" rtl="0">
@@ -10771,98 +10975,6 @@
               <a:buSzPts val="1400"/>
               <a:buChar char="○"/>
             </a:pPr>
-            <a:endParaRPr dirty="0"/>
-          </a:p>
-          <a:p>
-            <a:pPr marL="457200" lvl="0" indent="-330200" algn="l" rtl="0">
-              <a:lnSpc>
-                <a:spcPct val="115000"/>
-              </a:lnSpc>
-              <a:spcBef>
-                <a:spcPts val="0"/>
-              </a:spcBef>
-              <a:spcAft>
-                <a:spcPts val="0"/>
-              </a:spcAft>
-              <a:buSzPts val="1600"/>
-              <a:buChar char="●"/>
-            </a:pPr>
-            <a:r>
-              <a:rPr lang="en" b="1" dirty="0"/>
-              <a:t>Expected results </a:t>
-            </a:r>
-            <a:r>
-              <a:rPr lang="en" dirty="0"/>
-              <a:t>at the end of the hackathon</a:t>
-            </a:r>
-            <a:endParaRPr dirty="0"/>
-          </a:p>
-          <a:p>
-            <a:pPr marL="914400" lvl="1" indent="-317500" algn="l" rtl="0">
-              <a:lnSpc>
-                <a:spcPct val="115000"/>
-              </a:lnSpc>
-              <a:spcBef>
-                <a:spcPts val="0"/>
-              </a:spcBef>
-              <a:spcAft>
-                <a:spcPts val="0"/>
-              </a:spcAft>
-              <a:buSzPts val="1400"/>
-              <a:buChar char="○"/>
-            </a:pPr>
-            <a:r>
-              <a:rPr lang="en-GB" dirty="0" smtClean="0"/>
-              <a:t>M1: </a:t>
-            </a:r>
-            <a:r>
-              <a:rPr lang="en-GB" i="1" dirty="0" smtClean="0"/>
-              <a:t>Exploration/Proof of Concept</a:t>
-            </a:r>
-          </a:p>
-          <a:p>
-            <a:pPr lvl="2">
-              <a:spcBef>
-                <a:spcPts val="0"/>
-              </a:spcBef>
-              <a:buChar char="○"/>
-            </a:pPr>
-            <a:r>
-              <a:rPr lang="en-GB" sz="1200" dirty="0" smtClean="0"/>
-              <a:t>Identif</a:t>
-            </a:r>
-            <a:r>
-              <a:rPr lang="en-GB" sz="1200" dirty="0" smtClean="0"/>
-              <a:t>y an appropriate Workflow (Galaxy/CWL/other)</a:t>
-            </a:r>
-          </a:p>
-          <a:p>
-            <a:pPr lvl="2">
-              <a:spcBef>
-                <a:spcPts val="0"/>
-              </a:spcBef>
-              <a:buChar char="○"/>
-            </a:pPr>
-            <a:r>
-              <a:rPr lang="en-GB" sz="1200" dirty="0" smtClean="0"/>
-              <a:t>Author a new Concept Map training material based on this workflow</a:t>
-            </a:r>
-            <a:endParaRPr sz="1200" dirty="0"/>
-          </a:p>
-          <a:p>
-            <a:pPr marL="914400" lvl="1" indent="-317500" algn="l" rtl="0">
-              <a:lnSpc>
-                <a:spcPct val="115000"/>
-              </a:lnSpc>
-              <a:spcBef>
-                <a:spcPts val="0"/>
-              </a:spcBef>
-              <a:spcAft>
-                <a:spcPts val="0"/>
-              </a:spcAft>
-              <a:buSzPts val="1400"/>
-              <a:buChar char="○"/>
-            </a:pPr>
             <a:r>
               <a:rPr lang="en-GB" dirty="0" smtClean="0"/>
               <a:t>M2: </a:t>
@@ -10885,7 +10997,7 @@
             </a:pPr>
             <a:r>
               <a:rPr lang="en-GB" dirty="0" smtClean="0"/>
-              <a:t>M1.1: Parse Workflow</a:t>
+              <a:t>M2.1: Create a Workflow parser to parse a workflow</a:t>
             </a:r>
           </a:p>
           <a:p>
@@ -10897,7 +11009,7 @@
             </a:pPr>
             <a:r>
               <a:rPr lang="en-GB" dirty="0" smtClean="0"/>
-              <a:t>M1.2: Generate Concept Map in </a:t>
+              <a:t>M2.2: Generate a Concept Map in </a:t>
             </a:r>
             <a:r>
               <a:rPr lang="en-GB" dirty="0" err="1" smtClean="0"/>
@@ -10905,7 +11017,7 @@
             </a:r>
             <a:r>
               <a:rPr lang="en-GB" dirty="0" smtClean="0"/>
-              <a:t> from parsed Workflow</a:t>
+              <a:t> from the information in the parsed Workflow</a:t>
             </a:r>
           </a:p>
           <a:p>
@@ -10917,7 +11029,7 @@
             </a:pPr>
             <a:r>
               <a:rPr lang="en-GB" dirty="0" smtClean="0"/>
-              <a:t>M1.3: Add description and associate </a:t>
+              <a:t>M2.3: Add a description and associate </a:t>
             </a:r>
             <a:r>
               <a:rPr lang="en-GB" dirty="0" err="1" smtClean="0"/>
@@ -10941,7 +11053,7 @@
             </a:r>
             <a:r>
               <a:rPr lang="en-GB" dirty="0" smtClean="0"/>
-              <a:t> resources</a:t>
+              <a:t> resources.</a:t>
             </a:r>
             <a:endParaRPr dirty="0"/>
           </a:p>
@@ -11147,15 +11259,7 @@
             </a:r>
             <a:r>
               <a:rPr lang="en-GB" b="1" dirty="0" smtClean="0"/>
-              <a:t>Workflow 2 </a:t>
-            </a:r>
-            <a:r>
-              <a:rPr lang="en-GB" b="1" dirty="0" err="1" smtClean="0"/>
-              <a:t>ConceptMap</a:t>
-            </a:r>
-            <a:r>
-              <a:rPr lang="en-GB" b="1" dirty="0" smtClean="0"/>
-              <a:t> importer </a:t>
+              <a:t>Workflow-2-ConceptMap importer </a:t>
             </a:r>
             <a:r>
               <a:rPr lang="en-GB" dirty="0" smtClean="0"/>
@@ -11175,7 +11279,7 @@
             </a:pPr>
             <a:r>
               <a:rPr lang="en-GB" dirty="0" smtClean="0"/>
-              <a:t>We can work with communities to add new training materials about their workflow</a:t>
+              <a:t>We can work with communities to turn common workflows into new training materials</a:t>
             </a:r>
           </a:p>
           <a:p>
@@ -11191,22 +11295,15 @@
             </a:pPr>
             <a:r>
               <a:rPr lang="en-GB" dirty="0" smtClean="0"/>
-              <a:t>Improvements to Concept Map application </a:t>
-            </a:r>
-          </a:p>
-          <a:p>
-            <a:pPr>
+              <a:t>Experiences today can be used to improve the Concept Map application in the future</a:t>
+            </a:r>
+          </a:p>
+          <a:p>
+            <a:pPr marL="127000" indent="0">
               <a:lnSpc>
                 <a:spcPct val="100000"/>
               </a:lnSpc>
-            </a:pPr>
-            <a:endParaRPr lang="en-GB" dirty="0" smtClean="0"/>
-          </a:p>
-          <a:p>
-            <a:pPr>
-              <a:lnSpc>
-                <a:spcPct val="100000"/>
-              </a:lnSpc>
+              <a:buNone/>
             </a:pPr>
             <a:endParaRPr lang="en-GB" dirty="0"/>
           </a:p>

</xml_diff>